<commit_message>
Updated slides with role models
</commit_message>
<xml_diff>
--- a/Engage_Lesson2/lesson2_organisms_slides.pptx
+++ b/Engage_Lesson2/lesson2_organisms_slides.pptx
@@ -5,18 +5,20 @@
     <p:sldMasterId id="2147483751" r:id="rId1"/>
   </p:sldMasterIdLst>
   <p:notesMasterIdLst>
-    <p:notesMasterId r:id="rId11"/>
+    <p:notesMasterId r:id="rId13"/>
   </p:notesMasterIdLst>
   <p:sldIdLst>
     <p:sldId id="256" r:id="rId2"/>
-    <p:sldId id="257" r:id="rId3"/>
-    <p:sldId id="258" r:id="rId4"/>
-    <p:sldId id="259" r:id="rId5"/>
-    <p:sldId id="260" r:id="rId6"/>
-    <p:sldId id="261" r:id="rId7"/>
-    <p:sldId id="262" r:id="rId8"/>
-    <p:sldId id="263" r:id="rId9"/>
-    <p:sldId id="264" r:id="rId10"/>
+    <p:sldId id="265" r:id="rId3"/>
+    <p:sldId id="257" r:id="rId4"/>
+    <p:sldId id="258" r:id="rId5"/>
+    <p:sldId id="259" r:id="rId6"/>
+    <p:sldId id="260" r:id="rId7"/>
+    <p:sldId id="261" r:id="rId8"/>
+    <p:sldId id="262" r:id="rId9"/>
+    <p:sldId id="263" r:id="rId10"/>
+    <p:sldId id="264" r:id="rId11"/>
+    <p:sldId id="266" r:id="rId12"/>
   </p:sldIdLst>
   <p:sldSz cx="12192000" cy="6858000"/>
   <p:notesSz cx="6858000" cy="9144000"/>
@@ -205,7 +207,7 @@
           <a:p>
             <a:fld id="{7B2FFAFA-A92F-454E-B417-B8906F4A9F22}" type="datetimeFigureOut">
               <a:rPr lang="en-GB" smtClean="0"/>
-              <a:t>09/08/2024</a:t>
+              <a:t>16/09/2024</a:t>
             </a:fld>
             <a:endParaRPr lang="en-GB"/>
           </a:p>
@@ -632,7 +634,7 @@
           <a:p>
             <a:fld id="{75272905-4043-40AD-9639-B265005E8596}" type="slidenum">
               <a:rPr lang="en-GB" smtClean="0"/>
-              <a:t>4</a:t>
+              <a:t>5</a:t>
             </a:fld>
             <a:endParaRPr lang="en-GB"/>
           </a:p>
@@ -772,7 +774,7 @@
           <a:p>
             <a:fld id="{75272905-4043-40AD-9639-B265005E8596}" type="slidenum">
               <a:rPr lang="en-GB" smtClean="0"/>
-              <a:t>5</a:t>
+              <a:t>6</a:t>
             </a:fld>
             <a:endParaRPr lang="en-GB"/>
           </a:p>
@@ -879,7 +881,7 @@
           <a:p>
             <a:fld id="{75272905-4043-40AD-9639-B265005E8596}" type="slidenum">
               <a:rPr lang="en-GB" smtClean="0"/>
-              <a:t>6</a:t>
+              <a:t>7</a:t>
             </a:fld>
             <a:endParaRPr lang="en-GB"/>
           </a:p>
@@ -986,7 +988,7 @@
           <a:p>
             <a:fld id="{75272905-4043-40AD-9639-B265005E8596}" type="slidenum">
               <a:rPr lang="en-GB" smtClean="0"/>
-              <a:t>7</a:t>
+              <a:t>8</a:t>
             </a:fld>
             <a:endParaRPr lang="en-GB"/>
           </a:p>
@@ -1256,7 +1258,7 @@
           <a:p>
             <a:fld id="{75272905-4043-40AD-9639-B265005E8596}" type="slidenum">
               <a:rPr lang="en-GB" smtClean="0"/>
-              <a:t>9</a:t>
+              <a:t>10</a:t>
             </a:fld>
             <a:endParaRPr lang="en-GB"/>
           </a:p>
@@ -1429,7 +1431,7 @@
           <a:p>
             <a:fld id="{11EAACC7-3B3F-47D1-959A-EF58926E955E}" type="datetimeFigureOut">
               <a:rPr lang="en-US" smtClean="0"/>
-              <a:t>8/9/2024</a:t>
+              <a:t>9/16/2024</a:t>
             </a:fld>
             <a:endParaRPr lang="en-US"/>
           </a:p>
@@ -1627,7 +1629,7 @@
           <a:p>
             <a:fld id="{11EAACC7-3B3F-47D1-959A-EF58926E955E}" type="datetimeFigureOut">
               <a:rPr lang="en-US" smtClean="0"/>
-              <a:t>8/9/2024</a:t>
+              <a:t>9/16/2024</a:t>
             </a:fld>
             <a:endParaRPr lang="en-US"/>
           </a:p>
@@ -1835,7 +1837,7 @@
           <a:p>
             <a:fld id="{11EAACC7-3B3F-47D1-959A-EF58926E955E}" type="datetimeFigureOut">
               <a:rPr lang="en-US" smtClean="0"/>
-              <a:t>8/9/2024</a:t>
+              <a:t>9/16/2024</a:t>
             </a:fld>
             <a:endParaRPr lang="en-US"/>
           </a:p>
@@ -2064,7 +2066,7 @@
           <a:p>
             <a:fld id="{11EAACC7-3B3F-47D1-959A-EF58926E955E}" type="datetimeFigureOut">
               <a:rPr lang="en-US" smtClean="0"/>
-              <a:t>8/9/2024</a:t>
+              <a:t>9/16/2024</a:t>
             </a:fld>
             <a:endParaRPr lang="en-US" dirty="0"/>
           </a:p>
@@ -2339,7 +2341,7 @@
           <a:p>
             <a:fld id="{11EAACC7-3B3F-47D1-959A-EF58926E955E}" type="datetimeFigureOut">
               <a:rPr lang="en-US" smtClean="0"/>
-              <a:t>8/9/2024</a:t>
+              <a:t>9/16/2024</a:t>
             </a:fld>
             <a:endParaRPr lang="en-US"/>
           </a:p>
@@ -2605,7 +2607,7 @@
           <a:p>
             <a:fld id="{11EAACC7-3B3F-47D1-959A-EF58926E955E}" type="datetimeFigureOut">
               <a:rPr lang="en-US" smtClean="0"/>
-              <a:t>8/9/2024</a:t>
+              <a:t>9/16/2024</a:t>
             </a:fld>
             <a:endParaRPr lang="en-US"/>
           </a:p>
@@ -3022,7 +3024,7 @@
           <a:p>
             <a:fld id="{11EAACC7-3B3F-47D1-959A-EF58926E955E}" type="datetimeFigureOut">
               <a:rPr lang="en-US" smtClean="0"/>
-              <a:t>8/9/2024</a:t>
+              <a:t>9/16/2024</a:t>
             </a:fld>
             <a:endParaRPr lang="en-US"/>
           </a:p>
@@ -3163,7 +3165,7 @@
           <a:p>
             <a:fld id="{11EAACC7-3B3F-47D1-959A-EF58926E955E}" type="datetimeFigureOut">
               <a:rPr lang="en-US" smtClean="0"/>
-              <a:t>8/9/2024</a:t>
+              <a:t>9/16/2024</a:t>
             </a:fld>
             <a:endParaRPr lang="en-US"/>
           </a:p>
@@ -3276,7 +3278,7 @@
           <a:p>
             <a:fld id="{11EAACC7-3B3F-47D1-959A-EF58926E955E}" type="datetimeFigureOut">
               <a:rPr lang="en-US" smtClean="0"/>
-              <a:t>8/9/2024</a:t>
+              <a:t>9/16/2024</a:t>
             </a:fld>
             <a:endParaRPr lang="en-US"/>
           </a:p>
@@ -3587,7 +3589,7 @@
           <a:p>
             <a:fld id="{11EAACC7-3B3F-47D1-959A-EF58926E955E}" type="datetimeFigureOut">
               <a:rPr lang="en-US" smtClean="0"/>
-              <a:t>8/9/2024</a:t>
+              <a:t>9/16/2024</a:t>
             </a:fld>
             <a:endParaRPr lang="en-US"/>
           </a:p>
@@ -3878,7 +3880,7 @@
           <a:p>
             <a:fld id="{11EAACC7-3B3F-47D1-959A-EF58926E955E}" type="datetimeFigureOut">
               <a:rPr lang="en-US" smtClean="0"/>
-              <a:t>8/9/2024</a:t>
+              <a:t>9/16/2024</a:t>
             </a:fld>
             <a:endParaRPr lang="en-US"/>
           </a:p>
@@ -4435,7 +4437,7 @@
           <a:p>
             <a:fld id="{11EAACC7-3B3F-47D1-959A-EF58926E955E}" type="datetimeFigureOut">
               <a:rPr lang="en-US" smtClean="0"/>
-              <a:t>8/9/2024</a:t>
+              <a:t>9/16/2024</a:t>
             </a:fld>
             <a:endParaRPr lang="en-US"/>
           </a:p>
@@ -5186,7 +5188,7 @@
 </p:sld>
 </file>
 
-<file path=ppt/slides/slide2.xml><?xml version="1.0" encoding="utf-8"?>
+<file path=ppt/slides/slide10.xml><?xml version="1.0" encoding="utf-8"?>
 <p:sld xmlns:a="http://schemas.openxmlformats.org/drawingml/2006/main" xmlns:r="http://schemas.openxmlformats.org/officeDocument/2006/relationships" xmlns:p="http://schemas.openxmlformats.org/presentationml/2006/main">
   <p:cSld>
     <p:spTree>
@@ -5208,7 +5210,7 @@
           <p:cNvPr id="2" name="Title 1">
             <a:extLst>
               <a:ext uri="{FF2B5EF4-FFF2-40B4-BE49-F238E27FC236}">
-                <a16:creationId xmlns:a16="http://schemas.microsoft.com/office/drawing/2014/main" id="{AFC0BC69-9090-BD3C-6E04-4C4A160DECA7}"/>
+                <a16:creationId xmlns:a16="http://schemas.microsoft.com/office/drawing/2014/main" id="{83FCD4D7-F050-4ABA-F944-1F1A68296269}"/>
               </a:ext>
             </a:extLst>
           </p:cNvPr>
@@ -5226,7 +5228,7 @@
           <a:p>
             <a:r>
               <a:rPr lang="en-GB" dirty="0"/>
-              <a:t>Lesson objectives</a:t>
+              <a:t>Technology in development</a:t>
             </a:r>
           </a:p>
         </p:txBody>
@@ -5236,7 +5238,7 @@
           <p:cNvPr id="3" name="Content Placeholder 2">
             <a:extLst>
               <a:ext uri="{FF2B5EF4-FFF2-40B4-BE49-F238E27FC236}">
-                <a16:creationId xmlns:a16="http://schemas.microsoft.com/office/drawing/2014/main" id="{2A40DA40-9966-72DD-9C8D-7B55B3A47517}"/>
+                <a16:creationId xmlns:a16="http://schemas.microsoft.com/office/drawing/2014/main" id="{14BDF061-870D-09DE-18E4-55A679FDF1B9}"/>
               </a:ext>
             </a:extLst>
           </p:cNvPr>
@@ -5247,76 +5249,96 @@
             <p:ph idx="1"/>
           </p:nvPr>
         </p:nvSpPr>
-        <p:spPr/>
-        <p:txBody>
-          <a:bodyPr/>
+        <p:spPr>
+          <a:xfrm>
+            <a:off x="1143000" y="2605338"/>
+            <a:ext cx="9906000" cy="4024424"/>
+          </a:xfrm>
+        </p:spPr>
+        <p:txBody>
+          <a:bodyPr>
+            <a:normAutofit/>
+          </a:bodyPr>
           <a:lstStyle/>
           <a:p>
-            <a:pPr marL="342900" lvl="0" indent="-342900">
-              <a:buSzPts val="1400"/>
-              <a:buFont typeface="Times New Roman" panose="02020603050405020304" pitchFamily="18" charset="0"/>
-              <a:buChar char="-"/>
-            </a:pPr>
-            <a:r>
-              <a:rPr lang="en-AU" dirty="0">
-                <a:effectLst/>
-                <a:ea typeface="Times New Roman" panose="02020603050405020304" pitchFamily="18" charset="0"/>
+            <a:r>
+              <a:rPr lang="en-GB" sz="3000" dirty="0"/>
+              <a:t>VR/AR </a:t>
+            </a:r>
+          </a:p>
+          <a:p>
+            <a:r>
+              <a:rPr lang="en-GB" sz="3000" dirty="0">
+                <a:solidFill>
+                  <a:srgbClr val="040C28"/>
+                </a:solidFill>
               </a:rPr>
-              <a:t>Consider the benefits and risks of technology for improving human movement</a:t>
-            </a:r>
-            <a:endParaRPr lang="en-GB" dirty="0">
-              <a:effectLst/>
-              <a:ea typeface="Times New Roman" panose="02020603050405020304" pitchFamily="18" charset="0"/>
-            </a:endParaRPr>
-          </a:p>
-          <a:p>
-            <a:pPr marL="342900" lvl="0" indent="-342900">
-              <a:buSzPts val="1400"/>
-              <a:buFont typeface="Times New Roman" panose="02020603050405020304" pitchFamily="18" charset="0"/>
-              <a:buChar char="-"/>
-            </a:pPr>
-            <a:r>
-              <a:rPr lang="en-AU" dirty="0">
-                <a:effectLst/>
-                <a:ea typeface="Times New Roman" panose="02020603050405020304" pitchFamily="18" charset="0"/>
+              <a:t>3D Bioprinting</a:t>
+            </a:r>
+          </a:p>
+          <a:p>
+            <a:r>
+              <a:rPr lang="en-GB" sz="3000" dirty="0">
+                <a:solidFill>
+                  <a:srgbClr val="040C28"/>
+                </a:solidFill>
               </a:rPr>
-              <a:t>Make deductions about how medical treatments work based on cells, tissues, organs and systems</a:t>
-            </a:r>
-            <a:endParaRPr lang="en-GB" dirty="0">
-              <a:effectLst/>
-              <a:ea typeface="Times New Roman" panose="02020603050405020304" pitchFamily="18" charset="0"/>
-            </a:endParaRPr>
-          </a:p>
-          <a:p>
-            <a:pPr marL="342900" lvl="0" indent="-342900">
-              <a:buSzPts val="1400"/>
-              <a:buFont typeface="Times New Roman" panose="02020603050405020304" pitchFamily="18" charset="0"/>
-              <a:buChar char="-"/>
-            </a:pPr>
-            <a:r>
-              <a:rPr lang="en-AU" dirty="0">
-                <a:effectLst/>
-                <a:ea typeface="Times New Roman" panose="02020603050405020304" pitchFamily="18" charset="0"/>
-              </a:rPr>
-              <a:t>Evaluate a possible treatment for a lung disease.</a:t>
-            </a:r>
-            <a:endParaRPr lang="en-GB" dirty="0">
-              <a:effectLst/>
-              <a:ea typeface="Times New Roman" panose="02020603050405020304" pitchFamily="18" charset="0"/>
-            </a:endParaRPr>
-          </a:p>
-          <a:p>
-            <a:pPr marL="0" indent="0">
-              <a:buNone/>
-            </a:pPr>
-            <a:endParaRPr lang="en-GB" dirty="0"/>
-          </a:p>
-        </p:txBody>
-      </p:sp>
+              <a:t>Blockchain technology</a:t>
+            </a:r>
+          </a:p>
+        </p:txBody>
+      </p:sp>
+      <p:pic>
+        <p:nvPicPr>
+          <p:cNvPr id="1026" name="Picture 2" descr="Augmented Reality in Healthcare | Swevens">
+            <a:extLst>
+              <a:ext uri="{FF2B5EF4-FFF2-40B4-BE49-F238E27FC236}">
+                <a16:creationId xmlns:a16="http://schemas.microsoft.com/office/drawing/2014/main" id="{583F8AF5-6CAC-3950-4C1C-BE113B5D728B}"/>
+              </a:ext>
+            </a:extLst>
+          </p:cNvPr>
+          <p:cNvPicPr>
+            <a:picLocks noChangeAspect="1" noChangeArrowheads="1"/>
+          </p:cNvPicPr>
+          <p:nvPr/>
+        </p:nvPicPr>
+        <p:blipFill>
+          <a:blip r:embed="rId3">
+            <a:extLst>
+              <a:ext uri="{28A0092B-C50C-407E-A947-70E740481C1C}">
+                <a14:useLocalDpi xmlns:a14="http://schemas.microsoft.com/office/drawing/2010/main" val="0"/>
+              </a:ext>
+            </a:extLst>
+          </a:blip>
+          <a:srcRect/>
+          <a:stretch>
+            <a:fillRect/>
+          </a:stretch>
+        </p:blipFill>
+        <p:spPr bwMode="auto">
+          <a:xfrm>
+            <a:off x="4771911" y="1787029"/>
+            <a:ext cx="6505705" cy="3680545"/>
+          </a:xfrm>
+          <a:prstGeom prst="rect">
+            <a:avLst/>
+          </a:prstGeom>
+          <a:noFill/>
+          <a:extLst>
+            <a:ext uri="{909E8E84-426E-40DD-AFC4-6F175D3DCCD1}">
+              <a14:hiddenFill xmlns:a14="http://schemas.microsoft.com/office/drawing/2010/main">
+                <a:solidFill>
+                  <a:srgbClr val="FFFFFF"/>
+                </a:solidFill>
+              </a14:hiddenFill>
+            </a:ext>
+          </a:extLst>
+        </p:spPr>
+      </p:pic>
     </p:spTree>
     <p:extLst>
       <p:ext uri="{BB962C8B-B14F-4D97-AF65-F5344CB8AC3E}">
-        <p14:creationId xmlns:p14="http://schemas.microsoft.com/office/powerpoint/2010/main" val="1162668091"/>
+        <p14:creationId xmlns:p14="http://schemas.microsoft.com/office/powerpoint/2010/main" val="853761416"/>
       </p:ext>
     </p:extLst>
   </p:cSld>
@@ -5326,99 +5348,7 @@
 </p:sld>
 </file>
 
-<file path=ppt/slides/slide3.xml><?xml version="1.0" encoding="utf-8"?>
-<p:sld xmlns:a="http://schemas.openxmlformats.org/drawingml/2006/main" xmlns:r="http://schemas.openxmlformats.org/officeDocument/2006/relationships" xmlns:p="http://schemas.openxmlformats.org/presentationml/2006/main">
-  <p:cSld>
-    <p:spTree>
-      <p:nvGrpSpPr>
-        <p:cNvPr id="1" name=""/>
-        <p:cNvGrpSpPr/>
-        <p:nvPr/>
-      </p:nvGrpSpPr>
-      <p:grpSpPr>
-        <a:xfrm>
-          <a:off x="0" y="0"/>
-          <a:ext cx="0" cy="0"/>
-          <a:chOff x="0" y="0"/>
-          <a:chExt cx="0" cy="0"/>
-        </a:xfrm>
-      </p:grpSpPr>
-      <p:sp>
-        <p:nvSpPr>
-          <p:cNvPr id="2" name="Title 1">
-            <a:extLst>
-              <a:ext uri="{FF2B5EF4-FFF2-40B4-BE49-F238E27FC236}">
-                <a16:creationId xmlns:a16="http://schemas.microsoft.com/office/drawing/2014/main" id="{ED415B47-9046-DC3C-6DE2-80951640A1AC}"/>
-              </a:ext>
-            </a:extLst>
-          </p:cNvPr>
-          <p:cNvSpPr>
-            <a:spLocks noGrp="1"/>
-          </p:cNvSpPr>
-          <p:nvPr>
-            <p:ph type="title"/>
-          </p:nvPr>
-        </p:nvSpPr>
-        <p:spPr/>
-        <p:txBody>
-          <a:bodyPr/>
-          <a:lstStyle/>
-          <a:p>
-            <a:r>
-              <a:rPr lang="en-GB" dirty="0"/>
-              <a:t>Technology in healthcare</a:t>
-            </a:r>
-          </a:p>
-        </p:txBody>
-      </p:sp>
-      <p:sp>
-        <p:nvSpPr>
-          <p:cNvPr id="3" name="Content Placeholder 2">
-            <a:extLst>
-              <a:ext uri="{FF2B5EF4-FFF2-40B4-BE49-F238E27FC236}">
-                <a16:creationId xmlns:a16="http://schemas.microsoft.com/office/drawing/2014/main" id="{6CE007BF-54B2-90D4-E142-883FE987E0F7}"/>
-              </a:ext>
-            </a:extLst>
-          </p:cNvPr>
-          <p:cNvSpPr>
-            <a:spLocks noGrp="1"/>
-          </p:cNvSpPr>
-          <p:nvPr>
-            <p:ph idx="1"/>
-          </p:nvPr>
-        </p:nvSpPr>
-        <p:spPr/>
-        <p:txBody>
-          <a:bodyPr/>
-          <a:lstStyle/>
-          <a:p>
-            <a:r>
-              <a:rPr lang="en-GB" dirty="0"/>
-              <a:t>Technology is used everywhere in healthcare, from using AI to X-ray machines. </a:t>
-            </a:r>
-          </a:p>
-          <a:p>
-            <a:r>
-              <a:rPr lang="en-GB" dirty="0"/>
-              <a:t>This set of slides introduces current technology and how it is used to keep us healthy</a:t>
-            </a:r>
-          </a:p>
-        </p:txBody>
-      </p:sp>
-    </p:spTree>
-    <p:extLst>
-      <p:ext uri="{BB962C8B-B14F-4D97-AF65-F5344CB8AC3E}">
-        <p14:creationId xmlns:p14="http://schemas.microsoft.com/office/powerpoint/2010/main" val="268339485"/>
-      </p:ext>
-    </p:extLst>
-  </p:cSld>
-  <p:clrMapOvr>
-    <a:masterClrMapping/>
-  </p:clrMapOvr>
-</p:sld>
-</file>
-
-<file path=ppt/slides/slide4.xml><?xml version="1.0" encoding="utf-8"?>
+<file path=ppt/slides/slide11.xml><?xml version="1.0" encoding="utf-8"?>
 <p:sld xmlns:a="http://schemas.openxmlformats.org/drawingml/2006/main" xmlns:r="http://schemas.openxmlformats.org/officeDocument/2006/relationships" xmlns:p="http://schemas.openxmlformats.org/presentationml/2006/main">
   <p:cSld>
     <p:bg>
@@ -5445,10 +5375,10 @@
       </p:grpSpPr>
       <p:sp useBgFill="1">
         <p:nvSpPr>
-          <p:cNvPr id="1031" name="Rectangle 1030">
-            <a:extLst>
-              <a:ext uri="{FF2B5EF4-FFF2-40B4-BE49-F238E27FC236}">
-                <a16:creationId xmlns:a16="http://schemas.microsoft.com/office/drawing/2014/main" id="{22171661-0838-4942-A149-8C1B789266A2}"/>
+          <p:cNvPr id="1035" name="Rectangle 1034">
+            <a:extLst>
+              <a:ext uri="{FF2B5EF4-FFF2-40B4-BE49-F238E27FC236}">
+                <a16:creationId xmlns:a16="http://schemas.microsoft.com/office/drawing/2014/main" id="{D6309531-94CD-4CF6-AACE-80EC085E0F34}"/>
               </a:ext>
               <a:ext uri="{C183D7F6-B498-43B3-948B-1728B52AA6E4}">
                 <adec:decorative xmlns:adec="http://schemas.microsoft.com/office/drawing/2017/decorative" val="1"/>
@@ -5524,6 +5454,986 @@
           <p:cNvPr id="2" name="Title 1">
             <a:extLst>
               <a:ext uri="{FF2B5EF4-FFF2-40B4-BE49-F238E27FC236}">
+                <a16:creationId xmlns:a16="http://schemas.microsoft.com/office/drawing/2014/main" id="{020428DD-26B0-D371-A64D-8E2D5E5589A1}"/>
+              </a:ext>
+            </a:extLst>
+          </p:cNvPr>
+          <p:cNvSpPr>
+            <a:spLocks noGrp="1"/>
+          </p:cNvSpPr>
+          <p:nvPr>
+            <p:ph type="title"/>
+          </p:nvPr>
+        </p:nvSpPr>
+        <p:spPr>
+          <a:xfrm>
+            <a:off x="5146159" y="685800"/>
+            <a:ext cx="6238688" cy="1382233"/>
+          </a:xfrm>
+        </p:spPr>
+        <p:txBody>
+          <a:bodyPr>
+            <a:normAutofit/>
+          </a:bodyPr>
+          <a:lstStyle/>
+          <a:p>
+            <a:r>
+              <a:rPr lang="en-GB" b="1" dirty="0"/>
+              <a:t>Fei-Fei Li</a:t>
+            </a:r>
+            <a:endParaRPr lang="en-GB" dirty="0"/>
+          </a:p>
+        </p:txBody>
+      </p:sp>
+      <p:pic>
+        <p:nvPicPr>
+          <p:cNvPr id="1030" name="Picture 6" descr="Fei-Fei Li - Deep Learning Indaba">
+            <a:extLst>
+              <a:ext uri="{FF2B5EF4-FFF2-40B4-BE49-F238E27FC236}">
+                <a16:creationId xmlns:a16="http://schemas.microsoft.com/office/drawing/2014/main" id="{F72D689C-C08B-1E8F-8856-750F562D34CA}"/>
+              </a:ext>
+            </a:extLst>
+          </p:cNvPr>
+          <p:cNvPicPr>
+            <a:picLocks noChangeAspect="1" noChangeArrowheads="1"/>
+          </p:cNvPicPr>
+          <p:nvPr/>
+        </p:nvPicPr>
+        <p:blipFill>
+          <a:blip r:embed="rId2">
+            <a:extLst>
+              <a:ext uri="{28A0092B-C50C-407E-A947-70E740481C1C}">
+                <a14:useLocalDpi xmlns:a14="http://schemas.microsoft.com/office/drawing/2010/main" val="0"/>
+              </a:ext>
+            </a:extLst>
+          </a:blip>
+          <a:srcRect l="17829" r="14078" b="-2"/>
+          <a:stretch/>
+        </p:blipFill>
+        <p:spPr bwMode="auto">
+          <a:xfrm>
+            <a:off x="20" y="-7444"/>
+            <a:ext cx="4966427" cy="6874330"/>
+          </a:xfrm>
+          <a:custGeom>
+            <a:avLst/>
+            <a:gdLst/>
+            <a:ahLst/>
+            <a:cxnLst/>
+            <a:rect l="l" t="t" r="r" b="b"/>
+            <a:pathLst>
+              <a:path w="4966447" h="6874330">
+                <a:moveTo>
+                  <a:pt x="0" y="0"/>
+                </a:moveTo>
+                <a:lnTo>
+                  <a:pt x="4966447" y="0"/>
+                </a:lnTo>
+                <a:lnTo>
+                  <a:pt x="3355712" y="6874330"/>
+                </a:lnTo>
+                <a:lnTo>
+                  <a:pt x="0" y="6874330"/>
+                </a:lnTo>
+                <a:close/>
+              </a:path>
+            </a:pathLst>
+          </a:custGeom>
+          <a:noFill/>
+          <a:extLst>
+            <a:ext uri="{909E8E84-426E-40DD-AFC4-6F175D3DCCD1}">
+              <a14:hiddenFill xmlns:a14="http://schemas.microsoft.com/office/drawing/2010/main">
+                <a:solidFill>
+                  <a:srgbClr val="FFFFFF"/>
+                </a:solidFill>
+              </a14:hiddenFill>
+            </a:ext>
+          </a:extLst>
+        </p:spPr>
+      </p:pic>
+      <p:sp>
+        <p:nvSpPr>
+          <p:cNvPr id="6" name="Content Placeholder 5">
+            <a:extLst>
+              <a:ext uri="{FF2B5EF4-FFF2-40B4-BE49-F238E27FC236}">
+                <a16:creationId xmlns:a16="http://schemas.microsoft.com/office/drawing/2014/main" id="{71E190BB-DD77-67D7-0C39-590F0CE92AF3}"/>
+              </a:ext>
+            </a:extLst>
+          </p:cNvPr>
+          <p:cNvSpPr>
+            <a:spLocks noGrp="1"/>
+          </p:cNvSpPr>
+          <p:nvPr>
+            <p:ph idx="1"/>
+          </p:nvPr>
+        </p:nvSpPr>
+        <p:spPr>
+          <a:xfrm>
+            <a:off x="5146158" y="2301949"/>
+            <a:ext cx="6238687" cy="4022650"/>
+          </a:xfrm>
+        </p:spPr>
+        <p:txBody>
+          <a:bodyPr>
+            <a:normAutofit/>
+          </a:bodyPr>
+          <a:lstStyle/>
+          <a:p>
+            <a:pPr marL="0" indent="0">
+              <a:buNone/>
+            </a:pPr>
+            <a:r>
+              <a:rPr lang="en-GB" sz="2200" b="1" dirty="0"/>
+              <a:t>Fei-Fei Li</a:t>
+            </a:r>
+            <a:r>
+              <a:rPr lang="en-GB" sz="2200" dirty="0"/>
+              <a:t> is a leading AI researcher and professor at Stanford, known for her groundbreaking work in </a:t>
+            </a:r>
+            <a:r>
+              <a:rPr lang="en-GB" sz="2200" b="1" dirty="0"/>
+              <a:t>computer vision</a:t>
+            </a:r>
+            <a:r>
+              <a:rPr lang="en-GB" sz="2200" dirty="0"/>
+              <a:t> and co-founding </a:t>
+            </a:r>
+            <a:r>
+              <a:rPr lang="en-GB" sz="2200" b="1" dirty="0"/>
+              <a:t>ImageNet</a:t>
+            </a:r>
+            <a:r>
+              <a:rPr lang="en-GB" sz="2200" dirty="0"/>
+              <a:t>, which revolutionized AI. In healthcare, she advocates for applying </a:t>
+            </a:r>
+            <a:r>
+              <a:rPr lang="en-GB" sz="2200" b="1" dirty="0"/>
+              <a:t>AI in diagnostics</a:t>
+            </a:r>
+            <a:r>
+              <a:rPr lang="en-GB" sz="2200" dirty="0"/>
+              <a:t>, improving tools for early disease detection, like cancer. A champion of ethical AI, Li co-founded </a:t>
+            </a:r>
+            <a:r>
+              <a:rPr lang="en-GB" sz="2200" b="1" dirty="0"/>
+              <a:t>AI4ALL</a:t>
+            </a:r>
+            <a:r>
+              <a:rPr lang="en-GB" sz="2200" dirty="0"/>
+              <a:t> to promote diversity in the field and emphasizes the need for </a:t>
+            </a:r>
+            <a:r>
+              <a:rPr lang="en-GB" sz="2200" b="1" dirty="0"/>
+              <a:t>human-</a:t>
+            </a:r>
+            <a:r>
+              <a:rPr lang="en-GB" sz="2200" b="1" dirty="0" err="1"/>
+              <a:t>centered</a:t>
+            </a:r>
+            <a:r>
+              <a:rPr lang="en-GB" sz="2200" b="1" dirty="0"/>
+              <a:t> AI</a:t>
+            </a:r>
+            <a:r>
+              <a:rPr lang="en-GB" sz="2200" dirty="0"/>
+              <a:t> that respects privacy and equity. Her work bridges cutting-edge AI innovation with a mission to make healthcare more accurate, inclusive, and compassionate.</a:t>
+            </a:r>
+          </a:p>
+        </p:txBody>
+      </p:sp>
+      <p:cxnSp>
+        <p:nvCxnSpPr>
+          <p:cNvPr id="1037" name="Straight Connector 1036">
+            <a:extLst>
+              <a:ext uri="{FF2B5EF4-FFF2-40B4-BE49-F238E27FC236}">
+                <a16:creationId xmlns:a16="http://schemas.microsoft.com/office/drawing/2014/main" id="{F75BF611-D2A5-4454-8C47-95B0BC422843}"/>
+              </a:ext>
+              <a:ext uri="{C183D7F6-B498-43B3-948B-1728B52AA6E4}">
+                <adec:decorative xmlns:adec="http://schemas.microsoft.com/office/drawing/2017/decorative" val="1"/>
+              </a:ext>
+            </a:extLst>
+          </p:cNvPr>
+          <p:cNvCxnSpPr>
+            <a:cxnSpLocks noGrp="1" noRot="1" noChangeAspect="1" noMove="1" noResize="1" noEditPoints="1" noAdjustHandles="1" noChangeArrowheads="1" noChangeShapeType="1"/>
+          </p:cNvCxnSpPr>
+          <p:nvPr>
+            <p:extLst>
+              <p:ext uri="{386F3935-93C4-4BCD-93E2-E3B085C9AB24}">
+                <p16:designElem xmlns:p16="http://schemas.microsoft.com/office/powerpoint/2015/main" val="1"/>
+              </p:ext>
+            </p:extLst>
+          </p:nvPr>
+        </p:nvCxnSpPr>
+        <p:spPr>
+          <a:xfrm flipH="1">
+            <a:off x="3627455" y="-19394"/>
+            <a:ext cx="806149" cy="6877392"/>
+          </a:xfrm>
+          <a:prstGeom prst="line">
+            <a:avLst/>
+          </a:prstGeom>
+          <a:ln w="12700">
+            <a:solidFill>
+              <a:schemeClr val="accent2">
+                <a:alpha val="70000"/>
+              </a:schemeClr>
+            </a:solidFill>
+          </a:ln>
+        </p:spPr>
+        <p:style>
+          <a:lnRef idx="1">
+            <a:schemeClr val="accent1"/>
+          </a:lnRef>
+          <a:fillRef idx="0">
+            <a:schemeClr val="accent1"/>
+          </a:fillRef>
+          <a:effectRef idx="0">
+            <a:schemeClr val="accent1"/>
+          </a:effectRef>
+          <a:fontRef idx="minor">
+            <a:schemeClr val="tx1"/>
+          </a:fontRef>
+        </p:style>
+      </p:cxnSp>
+    </p:spTree>
+    <p:extLst>
+      <p:ext uri="{BB962C8B-B14F-4D97-AF65-F5344CB8AC3E}">
+        <p14:creationId xmlns:p14="http://schemas.microsoft.com/office/powerpoint/2010/main" val="2099769604"/>
+      </p:ext>
+    </p:extLst>
+  </p:cSld>
+  <p:clrMapOvr>
+    <a:masterClrMapping/>
+  </p:clrMapOvr>
+</p:sld>
+</file>
+
+<file path=ppt/slides/slide2.xml><?xml version="1.0" encoding="utf-8"?>
+<p:sld xmlns:a="http://schemas.openxmlformats.org/drawingml/2006/main" xmlns:r="http://schemas.openxmlformats.org/officeDocument/2006/relationships" xmlns:p="http://schemas.openxmlformats.org/presentationml/2006/main">
+  <p:cSld>
+    <p:bg>
+      <p:bgPr>
+        <a:solidFill>
+          <a:schemeClr val="bg1"/>
+        </a:solidFill>
+        <a:effectLst/>
+      </p:bgPr>
+    </p:bg>
+    <p:spTree>
+      <p:nvGrpSpPr>
+        <p:cNvPr id="1" name=""/>
+        <p:cNvGrpSpPr/>
+        <p:nvPr/>
+      </p:nvGrpSpPr>
+      <p:grpSpPr>
+        <a:xfrm>
+          <a:off x="0" y="0"/>
+          <a:ext cx="0" cy="0"/>
+          <a:chOff x="0" y="0"/>
+          <a:chExt cx="0" cy="0"/>
+        </a:xfrm>
+      </p:grpSpPr>
+      <p:sp useBgFill="1">
+        <p:nvSpPr>
+          <p:cNvPr id="1037" name="Rectangle 1036">
+            <a:extLst>
+              <a:ext uri="{FF2B5EF4-FFF2-40B4-BE49-F238E27FC236}">
+                <a16:creationId xmlns:a16="http://schemas.microsoft.com/office/drawing/2014/main" id="{6C2997EE-0889-44C3-AC0D-18F26AC9AAAB}"/>
+              </a:ext>
+              <a:ext uri="{C183D7F6-B498-43B3-948B-1728B52AA6E4}">
+                <adec:decorative xmlns:adec="http://schemas.microsoft.com/office/drawing/2017/decorative" val="1"/>
+              </a:ext>
+            </a:extLst>
+          </p:cNvPr>
+          <p:cNvSpPr>
+            <a:spLocks noGrp="1" noRot="1" noChangeAspect="1" noMove="1" noResize="1" noEditPoints="1" noAdjustHandles="1" noChangeArrowheads="1" noChangeShapeType="1" noTextEdit="1"/>
+          </p:cNvSpPr>
+          <p:nvPr>
+            <p:extLst>
+              <p:ext uri="{386F3935-93C4-4BCD-93E2-E3B085C9AB24}">
+                <p16:designElem xmlns:p16="http://schemas.microsoft.com/office/powerpoint/2015/main" val="1"/>
+              </p:ext>
+            </p:extLst>
+          </p:nvPr>
+        </p:nvSpPr>
+        <p:spPr>
+          <a:xfrm>
+            <a:off x="0" y="0"/>
+            <a:ext cx="12192000" cy="6858000"/>
+          </a:xfrm>
+          <a:prstGeom prst="rect">
+            <a:avLst/>
+          </a:prstGeom>
+          <a:ln>
+            <a:noFill/>
+          </a:ln>
+        </p:spPr>
+        <p:style>
+          <a:lnRef idx="2">
+            <a:schemeClr val="accent1">
+              <a:shade val="50000"/>
+            </a:schemeClr>
+          </a:lnRef>
+          <a:fillRef idx="1">
+            <a:schemeClr val="accent1"/>
+          </a:fillRef>
+          <a:effectRef idx="0">
+            <a:schemeClr val="accent1"/>
+          </a:effectRef>
+          <a:fontRef idx="minor">
+            <a:schemeClr val="lt1"/>
+          </a:fontRef>
+        </p:style>
+        <p:txBody>
+          <a:bodyPr rtlCol="0" anchor="ctr"/>
+          <a:lstStyle/>
+          <a:p>
+            <a:pPr algn="ctr"/>
+            <a:endParaRPr lang="en-US"/>
+          </a:p>
+        </p:txBody>
+      </p:sp>
+      <p:pic>
+        <p:nvPicPr>
+          <p:cNvPr id="1030" name="Picture 6" descr="Electronic mental health (e-mental health) technologies [18]. | Download  Scientific Diagram">
+            <a:extLst>
+              <a:ext uri="{FF2B5EF4-FFF2-40B4-BE49-F238E27FC236}">
+                <a16:creationId xmlns:a16="http://schemas.microsoft.com/office/drawing/2014/main" id="{B91682E7-36EF-0A19-2EA5-72C1B2F2D01A}"/>
+              </a:ext>
+            </a:extLst>
+          </p:cNvPr>
+          <p:cNvPicPr>
+            <a:picLocks noChangeAspect="1" noChangeArrowheads="1"/>
+          </p:cNvPicPr>
+          <p:nvPr/>
+        </p:nvPicPr>
+        <p:blipFill>
+          <a:blip r:embed="rId2">
+            <a:extLst>
+              <a:ext uri="{28A0092B-C50C-407E-A947-70E740481C1C}">
+                <a14:useLocalDpi xmlns:a14="http://schemas.microsoft.com/office/drawing/2010/main" val="0"/>
+              </a:ext>
+            </a:extLst>
+          </a:blip>
+          <a:srcRect t="20575" r="-3" b="12509"/>
+          <a:stretch/>
+        </p:blipFill>
+        <p:spPr bwMode="auto">
+          <a:xfrm>
+            <a:off x="20" y="10"/>
+            <a:ext cx="7215381" cy="2969294"/>
+          </a:xfrm>
+          <a:custGeom>
+            <a:avLst/>
+            <a:gdLst/>
+            <a:ahLst/>
+            <a:cxnLst/>
+            <a:rect l="l" t="t" r="r" b="b"/>
+            <a:pathLst>
+              <a:path w="7215401" h="2969304">
+                <a:moveTo>
+                  <a:pt x="0" y="0"/>
+                </a:moveTo>
+                <a:lnTo>
+                  <a:pt x="677334" y="0"/>
+                </a:lnTo>
+                <a:lnTo>
+                  <a:pt x="1168036" y="0"/>
+                </a:lnTo>
+                <a:lnTo>
+                  <a:pt x="1205499" y="0"/>
+                </a:lnTo>
+                <a:lnTo>
+                  <a:pt x="1647632" y="0"/>
+                </a:lnTo>
+                <a:lnTo>
+                  <a:pt x="7215401" y="0"/>
+                </a:lnTo>
+                <a:lnTo>
+                  <a:pt x="5840224" y="2969304"/>
+                </a:lnTo>
+                <a:lnTo>
+                  <a:pt x="0" y="2969304"/>
+                </a:lnTo>
+                <a:close/>
+              </a:path>
+            </a:pathLst>
+          </a:custGeom>
+          <a:noFill/>
+          <a:extLst>
+            <a:ext uri="{909E8E84-426E-40DD-AFC4-6F175D3DCCD1}">
+              <a14:hiddenFill xmlns:a14="http://schemas.microsoft.com/office/drawing/2010/main">
+                <a:solidFill>
+                  <a:srgbClr val="FFFFFF"/>
+                </a:solidFill>
+              </a14:hiddenFill>
+            </a:ext>
+          </a:extLst>
+        </p:spPr>
+      </p:pic>
+      <p:pic>
+        <p:nvPicPr>
+          <p:cNvPr id="1028" name="Picture 4" descr="10 healthcare technology trends for 2022 | Philips">
+            <a:extLst>
+              <a:ext uri="{FF2B5EF4-FFF2-40B4-BE49-F238E27FC236}">
+                <a16:creationId xmlns:a16="http://schemas.microsoft.com/office/drawing/2014/main" id="{186F710E-DB0A-10A8-8B73-F24E7D0C834E}"/>
+              </a:ext>
+            </a:extLst>
+          </p:cNvPr>
+          <p:cNvPicPr>
+            <a:picLocks noChangeAspect="1" noChangeArrowheads="1"/>
+          </p:cNvPicPr>
+          <p:nvPr/>
+        </p:nvPicPr>
+        <p:blipFill>
+          <a:blip r:embed="rId3">
+            <a:extLst>
+              <a:ext uri="{28A0092B-C50C-407E-A947-70E740481C1C}">
+                <a14:useLocalDpi xmlns:a14="http://schemas.microsoft.com/office/drawing/2010/main" val="0"/>
+              </a:ext>
+            </a:extLst>
+          </a:blip>
+          <a:srcRect r="1473" b="1"/>
+          <a:stretch/>
+        </p:blipFill>
+        <p:spPr bwMode="auto">
+          <a:xfrm>
+            <a:off x="5622233" y="10"/>
+            <a:ext cx="6569769" cy="3750724"/>
+          </a:xfrm>
+          <a:custGeom>
+            <a:avLst/>
+            <a:gdLst/>
+            <a:ahLst/>
+            <a:cxnLst/>
+            <a:rect l="l" t="t" r="r" b="b"/>
+            <a:pathLst>
+              <a:path w="6569769" h="3750734">
+                <a:moveTo>
+                  <a:pt x="1738471" y="0"/>
+                </a:moveTo>
+                <a:lnTo>
+                  <a:pt x="6569769" y="0"/>
+                </a:lnTo>
+                <a:lnTo>
+                  <a:pt x="6569769" y="3750734"/>
+                </a:lnTo>
+                <a:lnTo>
+                  <a:pt x="0" y="3750734"/>
+                </a:lnTo>
+                <a:close/>
+              </a:path>
+            </a:pathLst>
+          </a:custGeom>
+          <a:noFill/>
+          <a:extLst>
+            <a:ext uri="{909E8E84-426E-40DD-AFC4-6F175D3DCCD1}">
+              <a14:hiddenFill xmlns:a14="http://schemas.microsoft.com/office/drawing/2010/main">
+                <a:solidFill>
+                  <a:srgbClr val="FFFFFF"/>
+                </a:solidFill>
+              </a14:hiddenFill>
+            </a:ext>
+          </a:extLst>
+        </p:spPr>
+      </p:pic>
+      <p:pic>
+        <p:nvPicPr>
+          <p:cNvPr id="1026" name="Picture 2" descr="Embracing AI for a holistic model of healthcare">
+            <a:extLst>
+              <a:ext uri="{FF2B5EF4-FFF2-40B4-BE49-F238E27FC236}">
+                <a16:creationId xmlns:a16="http://schemas.microsoft.com/office/drawing/2014/main" id="{CBB35817-AD91-48B9-9B8E-0F4D52C21EDC}"/>
+              </a:ext>
+            </a:extLst>
+          </p:cNvPr>
+          <p:cNvPicPr>
+            <a:picLocks noChangeAspect="1" noChangeArrowheads="1"/>
+          </p:cNvPicPr>
+          <p:nvPr/>
+        </p:nvPicPr>
+        <p:blipFill>
+          <a:blip r:embed="rId4">
+            <a:extLst>
+              <a:ext uri="{28A0092B-C50C-407E-A947-70E740481C1C}">
+                <a14:useLocalDpi xmlns:a14="http://schemas.microsoft.com/office/drawing/2010/main" val="0"/>
+              </a:ext>
+            </a:extLst>
+          </a:blip>
+          <a:srcRect t="689" b="43760"/>
+          <a:stretch/>
+        </p:blipFill>
+        <p:spPr bwMode="auto">
+          <a:xfrm>
+            <a:off x="4182011" y="3887894"/>
+            <a:ext cx="8009991" cy="2970106"/>
+          </a:xfrm>
+          <a:custGeom>
+            <a:avLst/>
+            <a:gdLst/>
+            <a:ahLst/>
+            <a:cxnLst/>
+            <a:rect l="l" t="t" r="r" b="b"/>
+            <a:pathLst>
+              <a:path w="8009991" h="2970106">
+                <a:moveTo>
+                  <a:pt x="1376648" y="0"/>
+                </a:moveTo>
+                <a:lnTo>
+                  <a:pt x="8009991" y="0"/>
+                </a:lnTo>
+                <a:lnTo>
+                  <a:pt x="8009991" y="2970106"/>
+                </a:lnTo>
+                <a:lnTo>
+                  <a:pt x="0" y="2970106"/>
+                </a:lnTo>
+                <a:close/>
+              </a:path>
+            </a:pathLst>
+          </a:custGeom>
+          <a:noFill/>
+          <a:extLst>
+            <a:ext uri="{909E8E84-426E-40DD-AFC4-6F175D3DCCD1}">
+              <a14:hiddenFill xmlns:a14="http://schemas.microsoft.com/office/drawing/2010/main">
+                <a:solidFill>
+                  <a:srgbClr val="FFFFFF"/>
+                </a:solidFill>
+              </a14:hiddenFill>
+            </a:ext>
+          </a:extLst>
+        </p:spPr>
+      </p:pic>
+      <p:pic>
+        <p:nvPicPr>
+          <p:cNvPr id="1032" name="Picture 8" descr="How Emerging Tech Is Helping Eliminate Sporting Industry Roadblocks">
+            <a:extLst>
+              <a:ext uri="{FF2B5EF4-FFF2-40B4-BE49-F238E27FC236}">
+                <a16:creationId xmlns:a16="http://schemas.microsoft.com/office/drawing/2014/main" id="{E60AA524-97F7-5424-C8C1-8687EACDB85E}"/>
+              </a:ext>
+            </a:extLst>
+          </p:cNvPr>
+          <p:cNvPicPr>
+            <a:picLocks noChangeAspect="1" noChangeArrowheads="1"/>
+          </p:cNvPicPr>
+          <p:nvPr/>
+        </p:nvPicPr>
+        <p:blipFill>
+          <a:blip r:embed="rId5">
+            <a:extLst>
+              <a:ext uri="{28A0092B-C50C-407E-A947-70E740481C1C}">
+                <a14:useLocalDpi xmlns:a14="http://schemas.microsoft.com/office/drawing/2010/main" val="0"/>
+              </a:ext>
+            </a:extLst>
+          </a:blip>
+          <a:srcRect l="6895" r="-3" b="-3"/>
+          <a:stretch/>
+        </p:blipFill>
+        <p:spPr bwMode="auto">
+          <a:xfrm>
+            <a:off x="1" y="3106464"/>
+            <a:ext cx="6209553" cy="3751536"/>
+          </a:xfrm>
+          <a:custGeom>
+            <a:avLst/>
+            <a:gdLst/>
+            <a:ahLst/>
+            <a:cxnLst/>
+            <a:rect l="l" t="t" r="r" b="b"/>
+            <a:pathLst>
+              <a:path w="6209553" h="3751536">
+                <a:moveTo>
+                  <a:pt x="0" y="0"/>
+                </a:moveTo>
+                <a:lnTo>
+                  <a:pt x="5776701" y="0"/>
+                </a:lnTo>
+                <a:lnTo>
+                  <a:pt x="4041567" y="3746529"/>
+                </a:lnTo>
+                <a:lnTo>
+                  <a:pt x="6209553" y="3746529"/>
+                </a:lnTo>
+                <a:lnTo>
+                  <a:pt x="6209553" y="3746530"/>
+                </a:lnTo>
+                <a:lnTo>
+                  <a:pt x="1647632" y="3746530"/>
+                </a:lnTo>
+                <a:lnTo>
+                  <a:pt x="1647632" y="3751536"/>
+                </a:lnTo>
+                <a:lnTo>
+                  <a:pt x="0" y="3751536"/>
+                </a:lnTo>
+                <a:close/>
+              </a:path>
+            </a:pathLst>
+          </a:custGeom>
+          <a:noFill/>
+          <a:extLst>
+            <a:ext uri="{909E8E84-426E-40DD-AFC4-6F175D3DCCD1}">
+              <a14:hiddenFill xmlns:a14="http://schemas.microsoft.com/office/drawing/2010/main">
+                <a:solidFill>
+                  <a:srgbClr val="FFFFFF"/>
+                </a:solidFill>
+              </a14:hiddenFill>
+            </a:ext>
+          </a:extLst>
+        </p:spPr>
+      </p:pic>
+    </p:spTree>
+    <p:extLst>
+      <p:ext uri="{BB962C8B-B14F-4D97-AF65-F5344CB8AC3E}">
+        <p14:creationId xmlns:p14="http://schemas.microsoft.com/office/powerpoint/2010/main" val="3812287354"/>
+      </p:ext>
+    </p:extLst>
+  </p:cSld>
+  <p:clrMapOvr>
+    <a:masterClrMapping/>
+  </p:clrMapOvr>
+</p:sld>
+</file>
+
+<file path=ppt/slides/slide3.xml><?xml version="1.0" encoding="utf-8"?>
+<p:sld xmlns:a="http://schemas.openxmlformats.org/drawingml/2006/main" xmlns:r="http://schemas.openxmlformats.org/officeDocument/2006/relationships" xmlns:p="http://schemas.openxmlformats.org/presentationml/2006/main">
+  <p:cSld>
+    <p:spTree>
+      <p:nvGrpSpPr>
+        <p:cNvPr id="1" name=""/>
+        <p:cNvGrpSpPr/>
+        <p:nvPr/>
+      </p:nvGrpSpPr>
+      <p:grpSpPr>
+        <a:xfrm>
+          <a:off x="0" y="0"/>
+          <a:ext cx="0" cy="0"/>
+          <a:chOff x="0" y="0"/>
+          <a:chExt cx="0" cy="0"/>
+        </a:xfrm>
+      </p:grpSpPr>
+      <p:sp>
+        <p:nvSpPr>
+          <p:cNvPr id="2" name="Title 1">
+            <a:extLst>
+              <a:ext uri="{FF2B5EF4-FFF2-40B4-BE49-F238E27FC236}">
+                <a16:creationId xmlns:a16="http://schemas.microsoft.com/office/drawing/2014/main" id="{AFC0BC69-9090-BD3C-6E04-4C4A160DECA7}"/>
+              </a:ext>
+            </a:extLst>
+          </p:cNvPr>
+          <p:cNvSpPr>
+            <a:spLocks noGrp="1"/>
+          </p:cNvSpPr>
+          <p:nvPr>
+            <p:ph type="title"/>
+          </p:nvPr>
+        </p:nvSpPr>
+        <p:spPr/>
+        <p:txBody>
+          <a:bodyPr/>
+          <a:lstStyle/>
+          <a:p>
+            <a:r>
+              <a:rPr lang="en-GB" dirty="0"/>
+              <a:t>Lesson objectives</a:t>
+            </a:r>
+          </a:p>
+        </p:txBody>
+      </p:sp>
+      <p:sp>
+        <p:nvSpPr>
+          <p:cNvPr id="3" name="Content Placeholder 2">
+            <a:extLst>
+              <a:ext uri="{FF2B5EF4-FFF2-40B4-BE49-F238E27FC236}">
+                <a16:creationId xmlns:a16="http://schemas.microsoft.com/office/drawing/2014/main" id="{2A40DA40-9966-72DD-9C8D-7B55B3A47517}"/>
+              </a:ext>
+            </a:extLst>
+          </p:cNvPr>
+          <p:cNvSpPr>
+            <a:spLocks noGrp="1"/>
+          </p:cNvSpPr>
+          <p:nvPr>
+            <p:ph idx="1"/>
+          </p:nvPr>
+        </p:nvSpPr>
+        <p:spPr/>
+        <p:txBody>
+          <a:bodyPr/>
+          <a:lstStyle/>
+          <a:p>
+            <a:pPr marL="342900" lvl="0" indent="-342900">
+              <a:buSzPts val="1400"/>
+              <a:buFont typeface="Times New Roman" panose="02020603050405020304" pitchFamily="18" charset="0"/>
+              <a:buChar char="-"/>
+            </a:pPr>
+            <a:r>
+              <a:rPr lang="en-AU" sz="3000" dirty="0">
+                <a:effectLst/>
+                <a:ea typeface="Times New Roman" panose="02020603050405020304" pitchFamily="18" charset="0"/>
+              </a:rPr>
+              <a:t>Consider the benefits and risks of technology for improving human movement</a:t>
+            </a:r>
+            <a:endParaRPr lang="en-GB" sz="3000" dirty="0">
+              <a:effectLst/>
+              <a:ea typeface="Times New Roman" panose="02020603050405020304" pitchFamily="18" charset="0"/>
+            </a:endParaRPr>
+          </a:p>
+          <a:p>
+            <a:pPr marL="342900" lvl="0" indent="-342900">
+              <a:buSzPts val="1400"/>
+              <a:buFont typeface="Times New Roman" panose="02020603050405020304" pitchFamily="18" charset="0"/>
+              <a:buChar char="-"/>
+            </a:pPr>
+            <a:r>
+              <a:rPr lang="en-AU" sz="3000" dirty="0">
+                <a:effectLst/>
+                <a:ea typeface="Times New Roman" panose="02020603050405020304" pitchFamily="18" charset="0"/>
+              </a:rPr>
+              <a:t>Make deductions about how medical treatments work based on cells, tissues, organs and systems</a:t>
+            </a:r>
+            <a:endParaRPr lang="en-GB" sz="3000" dirty="0">
+              <a:effectLst/>
+              <a:ea typeface="Times New Roman" panose="02020603050405020304" pitchFamily="18" charset="0"/>
+            </a:endParaRPr>
+          </a:p>
+          <a:p>
+            <a:pPr marL="342900" lvl="0" indent="-342900">
+              <a:buSzPts val="1400"/>
+              <a:buFont typeface="Times New Roman" panose="02020603050405020304" pitchFamily="18" charset="0"/>
+              <a:buChar char="-"/>
+            </a:pPr>
+            <a:r>
+              <a:rPr lang="en-AU" sz="3000" dirty="0">
+                <a:effectLst/>
+                <a:ea typeface="Times New Roman" panose="02020603050405020304" pitchFamily="18" charset="0"/>
+              </a:rPr>
+              <a:t>Evaluate a possible treatment for a lung disease.</a:t>
+            </a:r>
+            <a:endParaRPr lang="en-GB" sz="3000" dirty="0">
+              <a:effectLst/>
+              <a:ea typeface="Times New Roman" panose="02020603050405020304" pitchFamily="18" charset="0"/>
+            </a:endParaRPr>
+          </a:p>
+          <a:p>
+            <a:pPr marL="0" indent="0">
+              <a:buNone/>
+            </a:pPr>
+            <a:endParaRPr lang="en-GB" dirty="0"/>
+          </a:p>
+        </p:txBody>
+      </p:sp>
+    </p:spTree>
+    <p:extLst>
+      <p:ext uri="{BB962C8B-B14F-4D97-AF65-F5344CB8AC3E}">
+        <p14:creationId xmlns:p14="http://schemas.microsoft.com/office/powerpoint/2010/main" val="1162668091"/>
+      </p:ext>
+    </p:extLst>
+  </p:cSld>
+  <p:clrMapOvr>
+    <a:masterClrMapping/>
+  </p:clrMapOvr>
+</p:sld>
+</file>
+
+<file path=ppt/slides/slide4.xml><?xml version="1.0" encoding="utf-8"?>
+<p:sld xmlns:a="http://schemas.openxmlformats.org/drawingml/2006/main" xmlns:r="http://schemas.openxmlformats.org/officeDocument/2006/relationships" xmlns:p="http://schemas.openxmlformats.org/presentationml/2006/main">
+  <p:cSld>
+    <p:spTree>
+      <p:nvGrpSpPr>
+        <p:cNvPr id="1" name=""/>
+        <p:cNvGrpSpPr/>
+        <p:nvPr/>
+      </p:nvGrpSpPr>
+      <p:grpSpPr>
+        <a:xfrm>
+          <a:off x="0" y="0"/>
+          <a:ext cx="0" cy="0"/>
+          <a:chOff x="0" y="0"/>
+          <a:chExt cx="0" cy="0"/>
+        </a:xfrm>
+      </p:grpSpPr>
+      <p:sp>
+        <p:nvSpPr>
+          <p:cNvPr id="2" name="Title 1">
+            <a:extLst>
+              <a:ext uri="{FF2B5EF4-FFF2-40B4-BE49-F238E27FC236}">
+                <a16:creationId xmlns:a16="http://schemas.microsoft.com/office/drawing/2014/main" id="{ED415B47-9046-DC3C-6DE2-80951640A1AC}"/>
+              </a:ext>
+            </a:extLst>
+          </p:cNvPr>
+          <p:cNvSpPr>
+            <a:spLocks noGrp="1"/>
+          </p:cNvSpPr>
+          <p:nvPr>
+            <p:ph type="title"/>
+          </p:nvPr>
+        </p:nvSpPr>
+        <p:spPr/>
+        <p:txBody>
+          <a:bodyPr/>
+          <a:lstStyle/>
+          <a:p>
+            <a:r>
+              <a:rPr lang="en-GB" dirty="0"/>
+              <a:t>Technology in healthcare</a:t>
+            </a:r>
+          </a:p>
+        </p:txBody>
+      </p:sp>
+      <p:sp>
+        <p:nvSpPr>
+          <p:cNvPr id="3" name="Content Placeholder 2">
+            <a:extLst>
+              <a:ext uri="{FF2B5EF4-FFF2-40B4-BE49-F238E27FC236}">
+                <a16:creationId xmlns:a16="http://schemas.microsoft.com/office/drawing/2014/main" id="{6CE007BF-54B2-90D4-E142-883FE987E0F7}"/>
+              </a:ext>
+            </a:extLst>
+          </p:cNvPr>
+          <p:cNvSpPr>
+            <a:spLocks noGrp="1"/>
+          </p:cNvSpPr>
+          <p:nvPr>
+            <p:ph idx="1"/>
+          </p:nvPr>
+        </p:nvSpPr>
+        <p:spPr/>
+        <p:txBody>
+          <a:bodyPr>
+            <a:normAutofit/>
+          </a:bodyPr>
+          <a:lstStyle/>
+          <a:p>
+            <a:r>
+              <a:rPr lang="en-GB" sz="3000" dirty="0"/>
+              <a:t>Technology is used everywhere in healthcare, from using AI to X-ray machines. </a:t>
+            </a:r>
+          </a:p>
+          <a:p>
+            <a:r>
+              <a:rPr lang="en-GB" sz="3000" dirty="0"/>
+              <a:t>This set of slides introduces current technology and how it is used to keep us healthy</a:t>
+            </a:r>
+          </a:p>
+        </p:txBody>
+      </p:sp>
+    </p:spTree>
+    <p:extLst>
+      <p:ext uri="{BB962C8B-B14F-4D97-AF65-F5344CB8AC3E}">
+        <p14:creationId xmlns:p14="http://schemas.microsoft.com/office/powerpoint/2010/main" val="268339485"/>
+      </p:ext>
+    </p:extLst>
+  </p:cSld>
+  <p:clrMapOvr>
+    <a:masterClrMapping/>
+  </p:clrMapOvr>
+</p:sld>
+</file>
+
+<file path=ppt/slides/slide5.xml><?xml version="1.0" encoding="utf-8"?>
+<p:sld xmlns:a="http://schemas.openxmlformats.org/drawingml/2006/main" xmlns:r="http://schemas.openxmlformats.org/officeDocument/2006/relationships" xmlns:p="http://schemas.openxmlformats.org/presentationml/2006/main">
+  <p:cSld>
+    <p:bg>
+      <p:bgPr>
+        <a:solidFill>
+          <a:schemeClr val="bg1"/>
+        </a:solidFill>
+        <a:effectLst/>
+      </p:bgPr>
+    </p:bg>
+    <p:spTree>
+      <p:nvGrpSpPr>
+        <p:cNvPr id="1" name=""/>
+        <p:cNvGrpSpPr/>
+        <p:nvPr/>
+      </p:nvGrpSpPr>
+      <p:grpSpPr>
+        <a:xfrm>
+          <a:off x="0" y="0"/>
+          <a:ext cx="0" cy="0"/>
+          <a:chOff x="0" y="0"/>
+          <a:chExt cx="0" cy="0"/>
+        </a:xfrm>
+      </p:grpSpPr>
+      <p:sp useBgFill="1">
+        <p:nvSpPr>
+          <p:cNvPr id="1031" name="Rectangle 1030">
+            <a:extLst>
+              <a:ext uri="{FF2B5EF4-FFF2-40B4-BE49-F238E27FC236}">
+                <a16:creationId xmlns:a16="http://schemas.microsoft.com/office/drawing/2014/main" id="{22171661-0838-4942-A149-8C1B789266A2}"/>
+              </a:ext>
+              <a:ext uri="{C183D7F6-B498-43B3-948B-1728B52AA6E4}">
+                <adec:decorative xmlns:adec="http://schemas.microsoft.com/office/drawing/2017/decorative" val="1"/>
+              </a:ext>
+            </a:extLst>
+          </p:cNvPr>
+          <p:cNvSpPr>
+            <a:spLocks noGrp="1" noRot="1" noChangeAspect="1" noMove="1" noResize="1" noEditPoints="1" noAdjustHandles="1" noChangeArrowheads="1" noChangeShapeType="1" noTextEdit="1"/>
+          </p:cNvSpPr>
+          <p:nvPr>
+            <p:extLst>
+              <p:ext uri="{386F3935-93C4-4BCD-93E2-E3B085C9AB24}">
+                <p16:designElem xmlns:p16="http://schemas.microsoft.com/office/powerpoint/2015/main" val="1"/>
+              </p:ext>
+            </p:extLst>
+          </p:nvPr>
+        </p:nvSpPr>
+        <p:spPr>
+          <a:xfrm>
+            <a:off x="0" y="0"/>
+            <a:ext cx="12192000" cy="6858000"/>
+          </a:xfrm>
+          <a:prstGeom prst="rect">
+            <a:avLst/>
+          </a:prstGeom>
+          <a:ln w="12700" cap="flat" cmpd="sng" algn="ctr">
+            <a:noFill/>
+            <a:prstDash val="solid"/>
+            <a:miter lim="800000"/>
+          </a:ln>
+          <a:effectLst/>
+          <a:extLst>
+            <a:ext uri="{91240B29-F687-4F45-9708-019B960494DF}">
+              <a14:hiddenLine xmlns:a14="http://schemas.microsoft.com/office/drawing/2010/main" w="12700" cap="flat" cmpd="sng" algn="ctr">
+                <a:solidFill>
+                  <a:schemeClr val="accent1">
+                    <a:shade val="50000"/>
+                  </a:schemeClr>
+                </a:solidFill>
+                <a:prstDash val="solid"/>
+                <a:miter lim="800000"/>
+              </a14:hiddenLine>
+            </a:ext>
+          </a:extLst>
+        </p:spPr>
+        <p:style>
+          <a:lnRef idx="2">
+            <a:schemeClr val="accent1">
+              <a:shade val="50000"/>
+            </a:schemeClr>
+          </a:lnRef>
+          <a:fillRef idx="1">
+            <a:schemeClr val="accent1"/>
+          </a:fillRef>
+          <a:effectRef idx="0">
+            <a:schemeClr val="accent1"/>
+          </a:effectRef>
+          <a:fontRef idx="minor">
+            <a:schemeClr val="lt1"/>
+          </a:fontRef>
+        </p:style>
+        <p:txBody>
+          <a:bodyPr rtlCol="0" anchor="ctr"/>
+          <a:lstStyle/>
+          <a:p>
+            <a:pPr algn="ctr"/>
+            <a:endParaRPr lang="en-US"/>
+          </a:p>
+        </p:txBody>
+      </p:sp>
+      <p:sp>
+        <p:nvSpPr>
+          <p:cNvPr id="2" name="Title 1">
+            <a:extLst>
+              <a:ext uri="{FF2B5EF4-FFF2-40B4-BE49-F238E27FC236}">
                 <a16:creationId xmlns:a16="http://schemas.microsoft.com/office/drawing/2014/main" id="{C94B8269-C476-0E8A-351D-208EB089C02E}"/>
               </a:ext>
             </a:extLst>
@@ -5590,7 +6500,7 @@
               <a:buChar char="•"/>
             </a:pPr>
             <a:r>
-              <a:rPr lang="en-US" sz="2400" dirty="0">
+              <a:rPr lang="en-US" sz="3000" dirty="0">
                 <a:solidFill>
                   <a:schemeClr val="tx2"/>
                 </a:solidFill>
@@ -5608,7 +6518,7 @@
               <a:buChar char="•"/>
             </a:pPr>
             <a:r>
-              <a:rPr lang="en-US" sz="2400" dirty="0">
+              <a:rPr lang="en-US" sz="3000" dirty="0">
                 <a:solidFill>
                   <a:schemeClr val="tx2"/>
                 </a:solidFill>
@@ -5626,7 +6536,7 @@
               <a:buChar char="•"/>
             </a:pPr>
             <a:r>
-              <a:rPr lang="en-US" sz="2400" dirty="0">
+              <a:rPr lang="en-US" sz="3000" dirty="0">
                 <a:solidFill>
                   <a:schemeClr val="tx2"/>
                 </a:solidFill>
@@ -5644,7 +6554,7 @@
               <a:buChar char="•"/>
             </a:pPr>
             <a:r>
-              <a:rPr lang="en-US" sz="2400" dirty="0">
+              <a:rPr lang="en-US" sz="3000" dirty="0">
                 <a:solidFill>
                   <a:schemeClr val="tx2"/>
                 </a:solidFill>
@@ -5821,7 +6731,7 @@
 </p:sld>
 </file>
 
-<file path=ppt/slides/slide5.xml><?xml version="1.0" encoding="utf-8"?>
+<file path=ppt/slides/slide6.xml><?xml version="1.0" encoding="utf-8"?>
 <p:sld xmlns:a="http://schemas.openxmlformats.org/drawingml/2006/main" xmlns:r="http://schemas.openxmlformats.org/officeDocument/2006/relationships" xmlns:p="http://schemas.openxmlformats.org/presentationml/2006/main">
   <p:cSld>
     <p:bg>
@@ -6057,7 +6967,7 @@
               </a:lnSpc>
             </a:pPr>
             <a:r>
-              <a:rPr lang="en-GB" dirty="0"/>
+              <a:rPr lang="en-GB" sz="3000" dirty="0"/>
               <a:t>Can be used to measure</a:t>
             </a:r>
           </a:p>
@@ -6068,7 +6978,7 @@
               </a:lnSpc>
             </a:pPr>
             <a:r>
-              <a:rPr lang="en-GB" dirty="0"/>
+              <a:rPr lang="en-GB" sz="3000" dirty="0"/>
               <a:t>Glucose</a:t>
             </a:r>
           </a:p>
@@ -6079,7 +6989,7 @@
               </a:lnSpc>
             </a:pPr>
             <a:r>
-              <a:rPr lang="en-GB" dirty="0"/>
+              <a:rPr lang="en-GB" sz="3000" dirty="0"/>
               <a:t>Pulse</a:t>
             </a:r>
           </a:p>
@@ -6090,7 +7000,7 @@
               </a:lnSpc>
             </a:pPr>
             <a:r>
-              <a:rPr lang="en-GB" dirty="0"/>
+              <a:rPr lang="en-GB" sz="3000" dirty="0"/>
               <a:t>Heat</a:t>
             </a:r>
           </a:p>
@@ -6101,16 +7011,16 @@
               </a:lnSpc>
             </a:pPr>
             <a:r>
-              <a:rPr lang="en-GB" dirty="0"/>
+              <a:rPr lang="en-GB" sz="3000" dirty="0"/>
               <a:t>H</a:t>
             </a:r>
             <a:r>
-              <a:rPr lang="en-GB" b="0" i="0" dirty="0">
+              <a:rPr lang="en-GB" sz="3000" b="0" i="0" dirty="0">
                 <a:effectLst/>
               </a:rPr>
               <a:t>elp you to effectively study, note, and analyse your patients' conditions in real-time regardless of their location</a:t>
             </a:r>
-            <a:endParaRPr lang="en-GB" dirty="0"/>
+            <a:endParaRPr lang="en-GB" sz="3000" dirty="0"/>
           </a:p>
         </p:txBody>
       </p:sp>
@@ -6181,7 +7091,7 @@
 </p:sld>
 </file>
 
-<file path=ppt/slides/slide6.xml><?xml version="1.0" encoding="utf-8"?>
+<file path=ppt/slides/slide7.xml><?xml version="1.0" encoding="utf-8"?>
 <p:sld xmlns:a="http://schemas.openxmlformats.org/drawingml/2006/main" xmlns:r="http://schemas.openxmlformats.org/officeDocument/2006/relationships" xmlns:p="http://schemas.openxmlformats.org/presentationml/2006/main">
   <p:cSld>
     <p:spTree>
@@ -6318,8 +7228,8 @@
         </p:nvSpPr>
         <p:spPr>
           <a:xfrm>
-            <a:off x="953312" y="1828800"/>
-            <a:ext cx="4426792" cy="3785652"/>
+            <a:off x="259080" y="1828800"/>
+            <a:ext cx="5121024" cy="4708981"/>
           </a:xfrm>
           <a:prstGeom prst="rect">
             <a:avLst/>
@@ -6333,7 +7243,7 @@
           <a:lstStyle/>
           <a:p>
             <a:r>
-              <a:rPr lang="en-GB" sz="2400" b="0" i="0" dirty="0">
+              <a:rPr lang="en-GB" sz="3000" b="0" i="0" dirty="0">
                 <a:solidFill>
                   <a:srgbClr val="040C28"/>
                 </a:solidFill>
@@ -6342,7 +7252,7 @@
               <a:t>Motion sensors are used to track an athlete's movements, including acceleration, deceleration, and changes in direction</a:t>
             </a:r>
             <a:r>
-              <a:rPr lang="en-GB" sz="2400" b="0" i="0" dirty="0">
+              <a:rPr lang="en-GB" sz="3000" b="0" i="0" dirty="0">
                 <a:solidFill>
                   <a:srgbClr val="202124"/>
                 </a:solidFill>
@@ -6352,7 +7262,7 @@
             </a:r>
           </a:p>
           <a:p>
-            <a:endParaRPr lang="en-GB" sz="2400" dirty="0">
+            <a:endParaRPr lang="en-GB" sz="3000" dirty="0">
               <a:solidFill>
                 <a:srgbClr val="202124"/>
               </a:solidFill>
@@ -6360,7 +7270,7 @@
           </a:p>
           <a:p>
             <a:r>
-              <a:rPr lang="en-GB" sz="2400" b="0" i="0" dirty="0">
+              <a:rPr lang="en-GB" sz="3000" b="0" i="0" dirty="0">
                 <a:solidFill>
                   <a:srgbClr val="202124"/>
                 </a:solidFill>
@@ -6368,7 +7278,7 @@
               </a:rPr>
               <a:t>These devices help in understanding an athlete's agility and responsiveness, which are crucial for sports that require quick movements and changes in pace.</a:t>
             </a:r>
-            <a:endParaRPr lang="en-GB" sz="2400" dirty="0"/>
+            <a:endParaRPr lang="en-GB" sz="3000" dirty="0"/>
           </a:p>
         </p:txBody>
       </p:sp>
@@ -6385,7 +7295,7 @@
 </p:sld>
 </file>
 
-<file path=ppt/slides/slide7.xml><?xml version="1.0" encoding="utf-8"?>
+<file path=ppt/slides/slide8.xml><?xml version="1.0" encoding="utf-8"?>
 <p:sld xmlns:a="http://schemas.openxmlformats.org/drawingml/2006/main" xmlns:r="http://schemas.openxmlformats.org/officeDocument/2006/relationships" xmlns:p="http://schemas.openxmlformats.org/presentationml/2006/main">
   <p:cSld>
     <p:bg>
@@ -6766,12 +7676,12 @@
           <a:lstStyle/>
           <a:p>
             <a:r>
-              <a:rPr lang="en-GB" b="0" i="0" dirty="0">
+              <a:rPr lang="en-GB" sz="3000" b="0" i="0" dirty="0">
                 <a:effectLst/>
               </a:rPr>
               <a:t>Cardiac implantable electronic devices, including pacemakers, are designed to help control or monitor irregular heartbeats in people with certain heart rhythm disorders and heart failure.</a:t>
             </a:r>
-            <a:endParaRPr lang="en-GB" dirty="0"/>
+            <a:endParaRPr lang="en-GB" sz="3000" dirty="0"/>
           </a:p>
         </p:txBody>
       </p:sp>
@@ -6872,134 +7782,6 @@
 </p:sld>
 </file>
 
-<file path=ppt/slides/slide8.xml><?xml version="1.0" encoding="utf-8"?>
-<p:sld xmlns:a="http://schemas.openxmlformats.org/drawingml/2006/main" xmlns:r="http://schemas.openxmlformats.org/officeDocument/2006/relationships" xmlns:p="http://schemas.openxmlformats.org/presentationml/2006/main">
-  <p:cSld>
-    <p:spTree>
-      <p:nvGrpSpPr>
-        <p:cNvPr id="1" name=""/>
-        <p:cNvGrpSpPr/>
-        <p:nvPr/>
-      </p:nvGrpSpPr>
-      <p:grpSpPr>
-        <a:xfrm>
-          <a:off x="0" y="0"/>
-          <a:ext cx="0" cy="0"/>
-          <a:chOff x="0" y="0"/>
-          <a:chExt cx="0" cy="0"/>
-        </a:xfrm>
-      </p:grpSpPr>
-      <p:sp>
-        <p:nvSpPr>
-          <p:cNvPr id="2" name="Title 1">
-            <a:extLst>
-              <a:ext uri="{FF2B5EF4-FFF2-40B4-BE49-F238E27FC236}">
-                <a16:creationId xmlns:a16="http://schemas.microsoft.com/office/drawing/2014/main" id="{36876FD3-3B35-A804-6F05-C5A3F19D70DD}"/>
-              </a:ext>
-            </a:extLst>
-          </p:cNvPr>
-          <p:cNvSpPr>
-            <a:spLocks noGrp="1"/>
-          </p:cNvSpPr>
-          <p:nvPr>
-            <p:ph type="title"/>
-          </p:nvPr>
-        </p:nvSpPr>
-        <p:spPr/>
-        <p:txBody>
-          <a:bodyPr/>
-          <a:lstStyle/>
-          <a:p>
-            <a:r>
-              <a:rPr lang="en-GB" dirty="0"/>
-              <a:t>Create your own</a:t>
-            </a:r>
-          </a:p>
-        </p:txBody>
-      </p:sp>
-      <p:sp>
-        <p:nvSpPr>
-          <p:cNvPr id="3" name="Content Placeholder 2">
-            <a:extLst>
-              <a:ext uri="{FF2B5EF4-FFF2-40B4-BE49-F238E27FC236}">
-                <a16:creationId xmlns:a16="http://schemas.microsoft.com/office/drawing/2014/main" id="{B49A3D6F-5359-5B9B-8AAB-8DD32B8597FC}"/>
-              </a:ext>
-            </a:extLst>
-          </p:cNvPr>
-          <p:cNvSpPr>
-            <a:spLocks noGrp="1"/>
-          </p:cNvSpPr>
-          <p:nvPr>
-            <p:ph idx="1"/>
-          </p:nvPr>
-        </p:nvSpPr>
-        <p:spPr/>
-        <p:txBody>
-          <a:bodyPr/>
-          <a:lstStyle/>
-          <a:p>
-            <a:r>
-              <a:rPr lang="en-GB" dirty="0"/>
-              <a:t>Create a piece of technology which solves one of the two issues below</a:t>
-            </a:r>
-          </a:p>
-          <a:p>
-            <a:r>
-              <a:rPr lang="en-GB" dirty="0"/>
-              <a:t>Issue 1: Lung disease: Not enough oxygen being absorbed</a:t>
-            </a:r>
-          </a:p>
-          <a:p>
-            <a:r>
-              <a:rPr lang="en-GB" dirty="0"/>
-              <a:t>Issue 2: Tooth Decay Crisis in younger Children</a:t>
-            </a:r>
-          </a:p>
-          <a:p>
-            <a:pPr marL="0" indent="0">
-              <a:buNone/>
-            </a:pPr>
-            <a:endParaRPr lang="en-GB" dirty="0"/>
-          </a:p>
-          <a:p>
-            <a:pPr marL="0" indent="0">
-              <a:buNone/>
-            </a:pPr>
-            <a:r>
-              <a:rPr lang="en-GB" dirty="0"/>
-              <a:t>For example,</a:t>
-            </a:r>
-          </a:p>
-          <a:p>
-            <a:pPr marL="0" indent="0">
-              <a:buNone/>
-            </a:pPr>
-            <a:r>
-              <a:rPr lang="en-GB" dirty="0"/>
-              <a:t>Poster / Presentation / Model/ App design / Watch like device</a:t>
-            </a:r>
-          </a:p>
-          <a:p>
-            <a:pPr marL="0" indent="0">
-              <a:buNone/>
-            </a:pPr>
-            <a:endParaRPr lang="en-GB" dirty="0"/>
-          </a:p>
-        </p:txBody>
-      </p:sp>
-    </p:spTree>
-    <p:extLst>
-      <p:ext uri="{BB962C8B-B14F-4D97-AF65-F5344CB8AC3E}">
-        <p14:creationId xmlns:p14="http://schemas.microsoft.com/office/powerpoint/2010/main" val="3137427602"/>
-      </p:ext>
-    </p:extLst>
-  </p:cSld>
-  <p:clrMapOvr>
-    <a:masterClrMapping/>
-  </p:clrMapOvr>
-</p:sld>
-</file>
-
 <file path=ppt/slides/slide9.xml><?xml version="1.0" encoding="utf-8"?>
 <p:sld xmlns:a="http://schemas.openxmlformats.org/drawingml/2006/main" xmlns:r="http://schemas.openxmlformats.org/officeDocument/2006/relationships" xmlns:p="http://schemas.openxmlformats.org/presentationml/2006/main">
   <p:cSld>
@@ -7022,7 +7804,7 @@
           <p:cNvPr id="2" name="Title 1">
             <a:extLst>
               <a:ext uri="{FF2B5EF4-FFF2-40B4-BE49-F238E27FC236}">
-                <a16:creationId xmlns:a16="http://schemas.microsoft.com/office/drawing/2014/main" id="{83FCD4D7-F050-4ABA-F944-1F1A68296269}"/>
+                <a16:creationId xmlns:a16="http://schemas.microsoft.com/office/drawing/2014/main" id="{36876FD3-3B35-A804-6F05-C5A3F19D70DD}"/>
               </a:ext>
             </a:extLst>
           </p:cNvPr>
@@ -7040,7 +7822,7 @@
           <a:p>
             <a:r>
               <a:rPr lang="en-GB" dirty="0"/>
-              <a:t>Technology in development</a:t>
+              <a:t>Create your own</a:t>
             </a:r>
           </a:p>
         </p:txBody>
@@ -7050,7 +7832,7 @@
           <p:cNvPr id="3" name="Content Placeholder 2">
             <a:extLst>
               <a:ext uri="{FF2B5EF4-FFF2-40B4-BE49-F238E27FC236}">
-                <a16:creationId xmlns:a16="http://schemas.microsoft.com/office/drawing/2014/main" id="{14BDF061-870D-09DE-18E4-55A679FDF1B9}"/>
+                <a16:creationId xmlns:a16="http://schemas.microsoft.com/office/drawing/2014/main" id="{B49A3D6F-5359-5B9B-8AAB-8DD32B8597FC}"/>
               </a:ext>
             </a:extLst>
           </p:cNvPr>
@@ -7061,96 +7843,64 @@
             <p:ph idx="1"/>
           </p:nvPr>
         </p:nvSpPr>
-        <p:spPr>
-          <a:xfrm>
-            <a:off x="1143000" y="2605338"/>
-            <a:ext cx="9906000" cy="4024424"/>
-          </a:xfrm>
-        </p:spPr>
-        <p:txBody>
-          <a:bodyPr>
-            <a:normAutofit/>
-          </a:bodyPr>
+        <p:spPr/>
+        <p:txBody>
+          <a:bodyPr/>
           <a:lstStyle/>
           <a:p>
             <a:r>
-              <a:rPr lang="en-GB" dirty="0"/>
-              <a:t>VR/AR </a:t>
-            </a:r>
-          </a:p>
-          <a:p>
-            <a:r>
-              <a:rPr lang="en-GB" dirty="0">
-                <a:solidFill>
-                  <a:srgbClr val="040C28"/>
-                </a:solidFill>
-              </a:rPr>
-              <a:t>3D Bioprinting</a:t>
-            </a:r>
-          </a:p>
-          <a:p>
-            <a:r>
-              <a:rPr lang="en-GB" dirty="0">
-                <a:solidFill>
-                  <a:srgbClr val="040C28"/>
-                </a:solidFill>
-              </a:rPr>
-              <a:t>Blockchain technology</a:t>
-            </a:r>
-          </a:p>
-        </p:txBody>
-      </p:sp>
-      <p:pic>
-        <p:nvPicPr>
-          <p:cNvPr id="1026" name="Picture 2" descr="Augmented Reality in Healthcare | Swevens">
-            <a:extLst>
-              <a:ext uri="{FF2B5EF4-FFF2-40B4-BE49-F238E27FC236}">
-                <a16:creationId xmlns:a16="http://schemas.microsoft.com/office/drawing/2014/main" id="{583F8AF5-6CAC-3950-4C1C-BE113B5D728B}"/>
-              </a:ext>
-            </a:extLst>
-          </p:cNvPr>
-          <p:cNvPicPr>
-            <a:picLocks noChangeAspect="1" noChangeArrowheads="1"/>
-          </p:cNvPicPr>
-          <p:nvPr/>
-        </p:nvPicPr>
-        <p:blipFill>
-          <a:blip r:embed="rId3">
-            <a:extLst>
-              <a:ext uri="{28A0092B-C50C-407E-A947-70E740481C1C}">
-                <a14:useLocalDpi xmlns:a14="http://schemas.microsoft.com/office/drawing/2010/main" val="0"/>
-              </a:ext>
-            </a:extLst>
-          </a:blip>
-          <a:srcRect/>
-          <a:stretch>
-            <a:fillRect/>
-          </a:stretch>
-        </p:blipFill>
-        <p:spPr bwMode="auto">
-          <a:xfrm>
-            <a:off x="4421391" y="1741309"/>
-            <a:ext cx="6505705" cy="3680545"/>
-          </a:xfrm>
-          <a:prstGeom prst="rect">
-            <a:avLst/>
-          </a:prstGeom>
-          <a:noFill/>
-          <a:extLst>
-            <a:ext uri="{909E8E84-426E-40DD-AFC4-6F175D3DCCD1}">
-              <a14:hiddenFill xmlns:a14="http://schemas.microsoft.com/office/drawing/2010/main">
-                <a:solidFill>
-                  <a:srgbClr val="FFFFFF"/>
-                </a:solidFill>
-              </a14:hiddenFill>
-            </a:ext>
-          </a:extLst>
-        </p:spPr>
-      </p:pic>
+              <a:rPr lang="en-GB" sz="3000" dirty="0"/>
+              <a:t>Create a piece of technology which solves one of the two issues below</a:t>
+            </a:r>
+          </a:p>
+          <a:p>
+            <a:r>
+              <a:rPr lang="en-GB" sz="3000" dirty="0"/>
+              <a:t>Issue 1: Lung disease: Not enough oxygen being absorbed</a:t>
+            </a:r>
+          </a:p>
+          <a:p>
+            <a:r>
+              <a:rPr lang="en-GB" sz="3000" dirty="0"/>
+              <a:t>Issue 2: Tooth Decay Crisis in younger Children</a:t>
+            </a:r>
+          </a:p>
+          <a:p>
+            <a:pPr marL="0" indent="0">
+              <a:buNone/>
+            </a:pPr>
+            <a:endParaRPr lang="en-GB" sz="3000" dirty="0"/>
+          </a:p>
+          <a:p>
+            <a:pPr marL="0" indent="0">
+              <a:buNone/>
+            </a:pPr>
+            <a:r>
+              <a:rPr lang="en-GB" sz="3000" dirty="0"/>
+              <a:t>For example,</a:t>
+            </a:r>
+          </a:p>
+          <a:p>
+            <a:pPr marL="0" indent="0">
+              <a:buNone/>
+            </a:pPr>
+            <a:r>
+              <a:rPr lang="en-GB" sz="3000" dirty="0"/>
+              <a:t>Poster / Presentation / Model/ App design / Watch like device …</a:t>
+            </a:r>
+          </a:p>
+          <a:p>
+            <a:pPr marL="0" indent="0">
+              <a:buNone/>
+            </a:pPr>
+            <a:endParaRPr lang="en-GB" dirty="0"/>
+          </a:p>
+        </p:txBody>
+      </p:sp>
     </p:spTree>
     <p:extLst>
       <p:ext uri="{BB962C8B-B14F-4D97-AF65-F5344CB8AC3E}">
-        <p14:creationId xmlns:p14="http://schemas.microsoft.com/office/powerpoint/2010/main" val="853761416"/>
+        <p14:creationId xmlns:p14="http://schemas.microsoft.com/office/powerpoint/2010/main" val="3137427602"/>
       </p:ext>
     </p:extLst>
   </p:cSld>

</xml_diff>